<commit_message>
Started framework for presentation on Friday
</commit_message>
<xml_diff>
--- a/Docs/Project_presentation_20190823.pptx
+++ b/Docs/Project_presentation_20190823.pptx
@@ -5,37 +5,40 @@
     <p:sldMasterId id="2147483648" r:id="rId4"/>
   </p:sldMasterIdLst>
   <p:notesMasterIdLst>
-    <p:notesMasterId r:id="rId9"/>
+    <p:notesMasterId r:id="rId12"/>
   </p:notesMasterIdLst>
   <p:sldIdLst>
     <p:sldId id="256" r:id="rId5"/>
     <p:sldId id="261" r:id="rId6"/>
     <p:sldId id="262" r:id="rId7"/>
-    <p:sldId id="260" r:id="rId8"/>
+    <p:sldId id="263" r:id="rId8"/>
+    <p:sldId id="264" r:id="rId9"/>
+    <p:sldId id="265" r:id="rId10"/>
+    <p:sldId id="260" r:id="rId11"/>
   </p:sldIdLst>
   <p:sldSz cx="12192000" cy="6858000"/>
   <p:notesSz cx="6858000" cy="9144000"/>
   <p:embeddedFontLst>
     <p:embeddedFont>
-      <p:font typeface="Calibri" panose="020F0502020204030204" pitchFamily="34" charset="0"/>
-      <p:regular r:id="rId10"/>
-      <p:bold r:id="rId11"/>
-      <p:italic r:id="rId12"/>
-      <p:boldItalic r:id="rId13"/>
+      <p:font typeface="Montserrat" panose="020B0604020202020204" charset="0"/>
+      <p:regular r:id="rId13"/>
+      <p:bold r:id="rId14"/>
+      <p:italic r:id="rId15"/>
+      <p:boldItalic r:id="rId16"/>
     </p:embeddedFont>
     <p:embeddedFont>
       <p:font typeface="Helvetica" panose="020B0604020202020204" pitchFamily="34" charset="0"/>
-      <p:regular r:id="rId14"/>
-      <p:bold r:id="rId15"/>
-      <p:italic r:id="rId16"/>
-      <p:boldItalic r:id="rId17"/>
+      <p:regular r:id="rId17"/>
+      <p:bold r:id="rId18"/>
+      <p:italic r:id="rId19"/>
+      <p:boldItalic r:id="rId20"/>
     </p:embeddedFont>
     <p:embeddedFont>
-      <p:font typeface="Montserrat" panose="020B0604020202020204" charset="0"/>
-      <p:regular r:id="rId18"/>
-      <p:bold r:id="rId19"/>
-      <p:italic r:id="rId20"/>
-      <p:boldItalic r:id="rId21"/>
+      <p:font typeface="Calibri" panose="020F0502020204030204" pitchFamily="34" charset="0"/>
+      <p:regular r:id="rId21"/>
+      <p:bold r:id="rId22"/>
+      <p:italic r:id="rId23"/>
+      <p:boldItalic r:id="rId24"/>
     </p:embeddedFont>
   </p:embeddedFontLst>
   <p:defaultTextStyle>
@@ -150,6 +153,10 @@
     </p:ext>
   </p:extLst>
 </p:presentation>
+</file>
+
+<file path=ppt/revisionInfo.xml><?xml version="1.0" encoding="utf-8"?>
+<p1510:revInfo xmlns:a="http://schemas.openxmlformats.org/drawingml/2006/main" xmlns:r="http://schemas.openxmlformats.org/officeDocument/2006/relationships" xmlns:p1510="http://schemas.microsoft.com/office/powerpoint/2015/10/main"/>
 </file>
 
 <file path=ppt/notesMasters/notesMaster1.xml><?xml version="1.0" encoding="utf-8"?>
@@ -1107,35 +1114,35 @@
           <a:p>
             <a:pPr lvl="0"/>
             <a:r>
-              <a:rPr lang="en-US" smtClean="0"/>
+              <a:rPr lang="en-US"/>
               <a:t>Edit Master text styles</a:t>
             </a:r>
           </a:p>
           <a:p>
             <a:pPr lvl="1"/>
             <a:r>
-              <a:rPr lang="en-US" smtClean="0"/>
+              <a:rPr lang="en-US"/>
               <a:t>Second level</a:t>
             </a:r>
           </a:p>
           <a:p>
             <a:pPr lvl="2"/>
             <a:r>
-              <a:rPr lang="en-US" smtClean="0"/>
+              <a:rPr lang="en-US"/>
               <a:t>Third level</a:t>
             </a:r>
           </a:p>
           <a:p>
             <a:pPr lvl="3"/>
             <a:r>
-              <a:rPr lang="en-US" smtClean="0"/>
+              <a:rPr lang="en-US"/>
               <a:t>Fourth level</a:t>
             </a:r>
           </a:p>
           <a:p>
             <a:pPr lvl="4"/>
             <a:r>
-              <a:rPr lang="en-US" smtClean="0"/>
+              <a:rPr lang="en-US"/>
               <a:t>Fifth level</a:t>
             </a:r>
             <a:endParaRPr lang="en-US" dirty="0"/>
@@ -1326,35 +1333,35 @@
           <a:p>
             <a:pPr lvl="0"/>
             <a:r>
-              <a:rPr lang="en-US" smtClean="0"/>
+              <a:rPr lang="en-US"/>
               <a:t>Edit Master text styles</a:t>
             </a:r>
           </a:p>
           <a:p>
             <a:pPr lvl="1"/>
             <a:r>
-              <a:rPr lang="en-US" smtClean="0"/>
+              <a:rPr lang="en-US"/>
               <a:t>Second level</a:t>
             </a:r>
           </a:p>
           <a:p>
             <a:pPr lvl="2"/>
             <a:r>
-              <a:rPr lang="en-US" smtClean="0"/>
+              <a:rPr lang="en-US"/>
               <a:t>Third level</a:t>
             </a:r>
           </a:p>
           <a:p>
             <a:pPr lvl="3"/>
             <a:r>
-              <a:rPr lang="en-US" smtClean="0"/>
+              <a:rPr lang="en-US"/>
               <a:t>Fourth level</a:t>
             </a:r>
           </a:p>
           <a:p>
             <a:pPr lvl="4"/>
             <a:r>
-              <a:rPr lang="en-US" smtClean="0"/>
+              <a:rPr lang="en-US"/>
               <a:t>Fifth level</a:t>
             </a:r>
             <a:endParaRPr lang="en-US" dirty="0"/>
@@ -1487,35 +1494,35 @@
           <a:p>
             <a:pPr lvl="0"/>
             <a:r>
-              <a:rPr lang="en-US" smtClean="0"/>
+              <a:rPr lang="en-US"/>
               <a:t>Edit Master text styles</a:t>
             </a:r>
           </a:p>
           <a:p>
             <a:pPr lvl="1"/>
             <a:r>
-              <a:rPr lang="en-US" smtClean="0"/>
+              <a:rPr lang="en-US"/>
               <a:t>Second level</a:t>
             </a:r>
           </a:p>
           <a:p>
             <a:pPr lvl="2"/>
             <a:r>
-              <a:rPr lang="en-US" smtClean="0"/>
+              <a:rPr lang="en-US"/>
               <a:t>Third level</a:t>
             </a:r>
           </a:p>
           <a:p>
             <a:pPr lvl="3"/>
             <a:r>
-              <a:rPr lang="en-US" smtClean="0"/>
+              <a:rPr lang="en-US"/>
               <a:t>Fourth level</a:t>
             </a:r>
           </a:p>
           <a:p>
             <a:pPr lvl="4"/>
             <a:r>
-              <a:rPr lang="en-US" smtClean="0"/>
+              <a:rPr lang="en-US"/>
               <a:t>Fifth level</a:t>
             </a:r>
             <a:endParaRPr lang="en-US" dirty="0"/>
@@ -1657,7 +1664,7 @@
           <a:p>
             <a:pPr lvl="0"/>
             <a:r>
-              <a:rPr lang="en-US" smtClean="0"/>
+              <a:rPr lang="en-US"/>
               <a:t>Edit Master text styles</a:t>
             </a:r>
           </a:p>
@@ -1743,35 +1750,35 @@
           <a:p>
             <a:pPr lvl="0"/>
             <a:r>
-              <a:rPr lang="en-US" smtClean="0"/>
+              <a:rPr lang="en-US"/>
               <a:t>Edit Master text styles</a:t>
             </a:r>
           </a:p>
           <a:p>
             <a:pPr lvl="1"/>
             <a:r>
-              <a:rPr lang="en-US" smtClean="0"/>
+              <a:rPr lang="en-US"/>
               <a:t>Second level</a:t>
             </a:r>
           </a:p>
           <a:p>
             <a:pPr lvl="2"/>
             <a:r>
-              <a:rPr lang="en-US" smtClean="0"/>
+              <a:rPr lang="en-US"/>
               <a:t>Third level</a:t>
             </a:r>
           </a:p>
           <a:p>
             <a:pPr lvl="3"/>
             <a:r>
-              <a:rPr lang="en-US" smtClean="0"/>
+              <a:rPr lang="en-US"/>
               <a:t>Fourth level</a:t>
             </a:r>
           </a:p>
           <a:p>
             <a:pPr lvl="4"/>
             <a:r>
-              <a:rPr lang="en-US" smtClean="0"/>
+              <a:rPr lang="en-US"/>
               <a:t>Fifth level</a:t>
             </a:r>
             <a:endParaRPr lang="en-US" dirty="0"/>
@@ -1839,7 +1846,7 @@
           <a:p>
             <a:pPr lvl="0"/>
             <a:r>
-              <a:rPr lang="en-US" smtClean="0"/>
+              <a:rPr lang="en-US"/>
               <a:t>Edit Master text styles</a:t>
             </a:r>
           </a:p>
@@ -1925,35 +1932,35 @@
           <a:p>
             <a:pPr lvl="0"/>
             <a:r>
-              <a:rPr lang="en-US" smtClean="0"/>
+              <a:rPr lang="en-US"/>
               <a:t>Edit Master text styles</a:t>
             </a:r>
           </a:p>
           <a:p>
             <a:pPr lvl="1"/>
             <a:r>
-              <a:rPr lang="en-US" smtClean="0"/>
+              <a:rPr lang="en-US"/>
               <a:t>Second level</a:t>
             </a:r>
           </a:p>
           <a:p>
             <a:pPr lvl="2"/>
             <a:r>
-              <a:rPr lang="en-US" smtClean="0"/>
+              <a:rPr lang="en-US"/>
               <a:t>Third level</a:t>
             </a:r>
           </a:p>
           <a:p>
             <a:pPr lvl="3"/>
             <a:r>
-              <a:rPr lang="en-US" smtClean="0"/>
+              <a:rPr lang="en-US"/>
               <a:t>Fourth level</a:t>
             </a:r>
           </a:p>
           <a:p>
             <a:pPr lvl="4"/>
             <a:r>
-              <a:rPr lang="en-US" smtClean="0"/>
+              <a:rPr lang="en-US"/>
               <a:t>Fifth level</a:t>
             </a:r>
             <a:endParaRPr lang="en-US" dirty="0"/>
@@ -2283,35 +2290,35 @@
           <a:p>
             <a:pPr lvl="0"/>
             <a:r>
-              <a:rPr lang="en-US" smtClean="0"/>
+              <a:rPr lang="en-US"/>
               <a:t>Edit Master text styles</a:t>
             </a:r>
           </a:p>
           <a:p>
             <a:pPr lvl="1"/>
             <a:r>
-              <a:rPr lang="en-US" smtClean="0"/>
+              <a:rPr lang="en-US"/>
               <a:t>Second level</a:t>
             </a:r>
           </a:p>
           <a:p>
             <a:pPr lvl="2"/>
             <a:r>
-              <a:rPr lang="en-US" smtClean="0"/>
+              <a:rPr lang="en-US"/>
               <a:t>Third level</a:t>
             </a:r>
           </a:p>
           <a:p>
             <a:pPr lvl="3"/>
             <a:r>
-              <a:rPr lang="en-US" smtClean="0"/>
+              <a:rPr lang="en-US"/>
               <a:t>Fourth level</a:t>
             </a:r>
           </a:p>
           <a:p>
             <a:pPr lvl="4"/>
             <a:r>
-              <a:rPr lang="en-US" smtClean="0"/>
+              <a:rPr lang="en-US"/>
               <a:t>Fifth level</a:t>
             </a:r>
             <a:endParaRPr lang="en-US" dirty="0"/>
@@ -2379,7 +2386,7 @@
           <a:p>
             <a:pPr lvl="0"/>
             <a:r>
-              <a:rPr lang="en-US" smtClean="0"/>
+              <a:rPr lang="en-US"/>
               <a:t>Edit Master text styles</a:t>
             </a:r>
           </a:p>
@@ -2855,7 +2862,7 @@
           <a:lstStyle/>
           <a:p>
             <a:r>
-              <a:rPr lang="en-US" smtClean="0"/>
+              <a:rPr lang="en-US"/>
               <a:t>Click to edit Master title style</a:t>
             </a:r>
             <a:endParaRPr lang="en-US" dirty="0"/>
@@ -2889,35 +2896,35 @@
           <a:p>
             <a:pPr lvl="0"/>
             <a:r>
-              <a:rPr lang="en-US" smtClean="0"/>
+              <a:rPr lang="en-US"/>
               <a:t>Edit Master text styles</a:t>
             </a:r>
           </a:p>
           <a:p>
             <a:pPr lvl="1"/>
             <a:r>
-              <a:rPr lang="en-US" smtClean="0"/>
+              <a:rPr lang="en-US"/>
               <a:t>Second level</a:t>
             </a:r>
           </a:p>
           <a:p>
             <a:pPr lvl="2"/>
             <a:r>
-              <a:rPr lang="en-US" smtClean="0"/>
+              <a:rPr lang="en-US"/>
               <a:t>Third level</a:t>
             </a:r>
           </a:p>
           <a:p>
             <a:pPr lvl="3"/>
             <a:r>
-              <a:rPr lang="en-US" smtClean="0"/>
+              <a:rPr lang="en-US"/>
               <a:t>Fourth level</a:t>
             </a:r>
           </a:p>
           <a:p>
             <a:pPr lvl="4"/>
             <a:r>
-              <a:rPr lang="en-US" smtClean="0"/>
+              <a:rPr lang="en-US"/>
               <a:t>Fifth level</a:t>
             </a:r>
             <a:endParaRPr lang="en-US" dirty="0"/>
@@ -3397,10 +3404,9 @@
           <a:lstStyle/>
           <a:p>
             <a:r>
-              <a:rPr lang="en-US" dirty="0" smtClean="0"/>
+              <a:rPr lang="en-US" dirty="0"/>
               <a:t>MSc Project Presentation</a:t>
             </a:r>
-            <a:endParaRPr lang="en-US" dirty="0"/>
           </a:p>
         </p:txBody>
       </p:sp>
@@ -3420,10 +3426,9 @@
           <a:lstStyle/>
           <a:p>
             <a:r>
-              <a:rPr lang="en-US" dirty="0" smtClean="0"/>
+              <a:rPr lang="en-US" dirty="0"/>
               <a:t>John Booth</a:t>
             </a:r>
-            <a:endParaRPr lang="en-US" dirty="0"/>
           </a:p>
         </p:txBody>
       </p:sp>
@@ -3443,10 +3448,9 @@
           <a:lstStyle/>
           <a:p>
             <a:r>
-              <a:rPr lang="en-US" dirty="0" smtClean="0"/>
+              <a:rPr lang="en-US" dirty="0"/>
               <a:t>August 2019</a:t>
             </a:r>
-            <a:endParaRPr lang="en-US" dirty="0"/>
           </a:p>
         </p:txBody>
       </p:sp>
@@ -3507,7 +3511,7 @@
           <a:bodyPr/>
           <a:lstStyle/>
           <a:p>
-            <a:endParaRPr lang="en-US"/>
+            <a:endParaRPr lang="en-US" dirty="0"/>
           </a:p>
         </p:txBody>
       </p:sp>
@@ -3526,7 +3530,10 @@
           <a:bodyPr/>
           <a:lstStyle/>
           <a:p>
-            <a:endParaRPr lang="en-US"/>
+            <a:r>
+              <a:rPr lang="en-US" dirty="0"/>
+              <a:t>Methods</a:t>
+            </a:r>
           </a:p>
         </p:txBody>
       </p:sp>
@@ -3587,7 +3594,7 @@
           <a:bodyPr/>
           <a:lstStyle/>
           <a:p>
-            <a:endParaRPr lang="en-US"/>
+            <a:endParaRPr lang="en-US" dirty="0"/>
           </a:p>
         </p:txBody>
       </p:sp>
@@ -3606,7 +3613,10 @@
           <a:bodyPr/>
           <a:lstStyle/>
           <a:p>
-            <a:endParaRPr lang="en-US"/>
+            <a:r>
+              <a:rPr lang="en-US" dirty="0"/>
+              <a:t>Data</a:t>
+            </a:r>
           </a:p>
         </p:txBody>
       </p:sp>
@@ -3636,6 +3646,252 @@
 </file>
 
 <file path=ppt/slides/slide4.xml><?xml version="1.0" encoding="utf-8"?>
+<p:sld xmlns:a="http://schemas.openxmlformats.org/drawingml/2006/main" xmlns:r="http://schemas.openxmlformats.org/officeDocument/2006/relationships" xmlns:p="http://schemas.openxmlformats.org/presentationml/2006/main">
+  <p:cSld>
+    <p:spTree>
+      <p:nvGrpSpPr>
+        <p:cNvPr id="1" name=""/>
+        <p:cNvGrpSpPr/>
+        <p:nvPr/>
+      </p:nvGrpSpPr>
+      <p:grpSpPr>
+        <a:xfrm>
+          <a:off x="0" y="0"/>
+          <a:ext cx="0" cy="0"/>
+          <a:chOff x="0" y="0"/>
+          <a:chExt cx="0" cy="0"/>
+        </a:xfrm>
+      </p:grpSpPr>
+      <p:sp>
+        <p:nvSpPr>
+          <p:cNvPr id="2" name="Content Placeholder 1"/>
+          <p:cNvSpPr>
+            <a:spLocks noGrp="1"/>
+          </p:cNvSpPr>
+          <p:nvPr>
+            <p:ph idx="1"/>
+          </p:nvPr>
+        </p:nvSpPr>
+        <p:spPr/>
+        <p:txBody>
+          <a:bodyPr/>
+          <a:lstStyle/>
+          <a:p>
+            <a:endParaRPr lang="en-US"/>
+          </a:p>
+        </p:txBody>
+      </p:sp>
+      <p:sp>
+        <p:nvSpPr>
+          <p:cNvPr id="3" name="Title 2"/>
+          <p:cNvSpPr>
+            <a:spLocks noGrp="1"/>
+          </p:cNvSpPr>
+          <p:nvPr>
+            <p:ph type="title"/>
+          </p:nvPr>
+        </p:nvSpPr>
+        <p:spPr/>
+        <p:txBody>
+          <a:bodyPr/>
+          <a:lstStyle/>
+          <a:p>
+            <a:r>
+              <a:rPr lang="en-US" dirty="0"/>
+              <a:t>Analysis</a:t>
+            </a:r>
+          </a:p>
+        </p:txBody>
+      </p:sp>
+    </p:spTree>
+    <p:extLst>
+      <p:ext uri="{BB962C8B-B14F-4D97-AF65-F5344CB8AC3E}">
+        <p14:creationId xmlns:p14="http://schemas.microsoft.com/office/powerpoint/2010/main" val="3866143707"/>
+      </p:ext>
+    </p:extLst>
+  </p:cSld>
+  <p:clrMapOvr>
+    <a:masterClrMapping/>
+  </p:clrMapOvr>
+  <mc:AlternateContent xmlns:mc="http://schemas.openxmlformats.org/markup-compatibility/2006" xmlns:p14="http://schemas.microsoft.com/office/powerpoint/2010/main">
+    <mc:Choice Requires="p14">
+      <p:transition spd="med" p14:dur="700">
+        <p:fade/>
+      </p:transition>
+    </mc:Choice>
+    <mc:Fallback xmlns="">
+      <p:transition spd="med">
+        <p:fade/>
+      </p:transition>
+    </mc:Fallback>
+  </mc:AlternateContent>
+</p:sld>
+</file>
+
+<file path=ppt/slides/slide5.xml><?xml version="1.0" encoding="utf-8"?>
+<p:sld xmlns:a="http://schemas.openxmlformats.org/drawingml/2006/main" xmlns:r="http://schemas.openxmlformats.org/officeDocument/2006/relationships" xmlns:p="http://schemas.openxmlformats.org/presentationml/2006/main">
+  <p:cSld>
+    <p:spTree>
+      <p:nvGrpSpPr>
+        <p:cNvPr id="1" name=""/>
+        <p:cNvGrpSpPr/>
+        <p:nvPr/>
+      </p:nvGrpSpPr>
+      <p:grpSpPr>
+        <a:xfrm>
+          <a:off x="0" y="0"/>
+          <a:ext cx="0" cy="0"/>
+          <a:chOff x="0" y="0"/>
+          <a:chExt cx="0" cy="0"/>
+        </a:xfrm>
+      </p:grpSpPr>
+      <p:sp>
+        <p:nvSpPr>
+          <p:cNvPr id="2" name="Content Placeholder 1"/>
+          <p:cNvSpPr>
+            <a:spLocks noGrp="1"/>
+          </p:cNvSpPr>
+          <p:nvPr>
+            <p:ph idx="1"/>
+          </p:nvPr>
+        </p:nvSpPr>
+        <p:spPr/>
+        <p:txBody>
+          <a:bodyPr/>
+          <a:lstStyle/>
+          <a:p>
+            <a:endParaRPr lang="en-US"/>
+          </a:p>
+        </p:txBody>
+      </p:sp>
+      <p:sp>
+        <p:nvSpPr>
+          <p:cNvPr id="3" name="Title 2"/>
+          <p:cNvSpPr>
+            <a:spLocks noGrp="1"/>
+          </p:cNvSpPr>
+          <p:nvPr>
+            <p:ph type="title"/>
+          </p:nvPr>
+        </p:nvSpPr>
+        <p:spPr/>
+        <p:txBody>
+          <a:bodyPr/>
+          <a:lstStyle/>
+          <a:p>
+            <a:r>
+              <a:rPr lang="en-US" dirty="0"/>
+              <a:t>Results</a:t>
+            </a:r>
+          </a:p>
+        </p:txBody>
+      </p:sp>
+    </p:spTree>
+    <p:extLst>
+      <p:ext uri="{BB962C8B-B14F-4D97-AF65-F5344CB8AC3E}">
+        <p14:creationId xmlns:p14="http://schemas.microsoft.com/office/powerpoint/2010/main" val="3946054814"/>
+      </p:ext>
+    </p:extLst>
+  </p:cSld>
+  <p:clrMapOvr>
+    <a:masterClrMapping/>
+  </p:clrMapOvr>
+  <mc:AlternateContent xmlns:mc="http://schemas.openxmlformats.org/markup-compatibility/2006" xmlns:p14="http://schemas.microsoft.com/office/powerpoint/2010/main">
+    <mc:Choice Requires="p14">
+      <p:transition spd="med" p14:dur="700">
+        <p:fade/>
+      </p:transition>
+    </mc:Choice>
+    <mc:Fallback xmlns="">
+      <p:transition spd="med">
+        <p:fade/>
+      </p:transition>
+    </mc:Fallback>
+  </mc:AlternateContent>
+</p:sld>
+</file>
+
+<file path=ppt/slides/slide6.xml><?xml version="1.0" encoding="utf-8"?>
+<p:sld xmlns:a="http://schemas.openxmlformats.org/drawingml/2006/main" xmlns:r="http://schemas.openxmlformats.org/officeDocument/2006/relationships" xmlns:p="http://schemas.openxmlformats.org/presentationml/2006/main">
+  <p:cSld>
+    <p:spTree>
+      <p:nvGrpSpPr>
+        <p:cNvPr id="1" name=""/>
+        <p:cNvGrpSpPr/>
+        <p:nvPr/>
+      </p:nvGrpSpPr>
+      <p:grpSpPr>
+        <a:xfrm>
+          <a:off x="0" y="0"/>
+          <a:ext cx="0" cy="0"/>
+          <a:chOff x="0" y="0"/>
+          <a:chExt cx="0" cy="0"/>
+        </a:xfrm>
+      </p:grpSpPr>
+      <p:sp>
+        <p:nvSpPr>
+          <p:cNvPr id="2" name="Content Placeholder 1"/>
+          <p:cNvSpPr>
+            <a:spLocks noGrp="1"/>
+          </p:cNvSpPr>
+          <p:nvPr>
+            <p:ph idx="1"/>
+          </p:nvPr>
+        </p:nvSpPr>
+        <p:spPr/>
+        <p:txBody>
+          <a:bodyPr/>
+          <a:lstStyle/>
+          <a:p>
+            <a:endParaRPr lang="en-US"/>
+          </a:p>
+        </p:txBody>
+      </p:sp>
+      <p:sp>
+        <p:nvSpPr>
+          <p:cNvPr id="3" name="Title 2"/>
+          <p:cNvSpPr>
+            <a:spLocks noGrp="1"/>
+          </p:cNvSpPr>
+          <p:nvPr>
+            <p:ph type="title"/>
+          </p:nvPr>
+        </p:nvSpPr>
+        <p:spPr/>
+        <p:txBody>
+          <a:bodyPr/>
+          <a:lstStyle/>
+          <a:p>
+            <a:endParaRPr lang="en-US"/>
+          </a:p>
+        </p:txBody>
+      </p:sp>
+    </p:spTree>
+    <p:extLst>
+      <p:ext uri="{BB962C8B-B14F-4D97-AF65-F5344CB8AC3E}">
+        <p14:creationId xmlns:p14="http://schemas.microsoft.com/office/powerpoint/2010/main" val="2273221744"/>
+      </p:ext>
+    </p:extLst>
+  </p:cSld>
+  <p:clrMapOvr>
+    <a:masterClrMapping/>
+  </p:clrMapOvr>
+  <mc:AlternateContent xmlns:mc="http://schemas.openxmlformats.org/markup-compatibility/2006" xmlns:p14="http://schemas.microsoft.com/office/powerpoint/2010/main">
+    <mc:Choice Requires="p14">
+      <p:transition spd="med" p14:dur="700">
+        <p:fade/>
+      </p:transition>
+    </mc:Choice>
+    <mc:Fallback xmlns="">
+      <p:transition spd="med">
+        <p:fade/>
+      </p:transition>
+    </mc:Fallback>
+  </mc:AlternateContent>
+</p:sld>
+</file>
+
+<file path=ppt/slides/slide7.xml><?xml version="1.0" encoding="utf-8"?>
 <p:sld xmlns:a="http://schemas.openxmlformats.org/drawingml/2006/main" xmlns:r="http://schemas.openxmlformats.org/officeDocument/2006/relationships" xmlns:p="http://schemas.openxmlformats.org/presentationml/2006/main">
   <p:cSld>
     <p:spTree>
@@ -4601,6 +4857,15 @@
 </file>
 
 <file path=customXml/item1.xml><?xml version="1.0" encoding="utf-8"?>
+<?mso-contentType ?>
+<FormTemplates xmlns="http://schemas.microsoft.com/sharepoint/v3/contenttype/forms">
+  <Display>DocumentLibraryForm</Display>
+  <Edit>DocumentLibraryForm</Edit>
+  <New>DocumentLibraryForm</New>
+</FormTemplates>
+</file>
+
+<file path=customXml/item2.xml><?xml version="1.0" encoding="utf-8"?>
 <ct:contentTypeSchema xmlns:ct="http://schemas.microsoft.com/office/2006/metadata/contentType" xmlns:ma="http://schemas.microsoft.com/office/2006/metadata/properties/metaAttributes" ct:_="" ma:_="" ma:contentTypeName="Document" ma:contentTypeID="0x01010098E18DA79B345F42A60D0D21AFC85D5D" ma:contentTypeVersion="8" ma:contentTypeDescription="Create a new document." ma:contentTypeScope="" ma:versionID="c9f958584656585133256e26ca0f9530">
   <xsd:schema xmlns:xsd="http://www.w3.org/2001/XMLSchema" xmlns:xs="http://www.w3.org/2001/XMLSchema" xmlns:p="http://schemas.microsoft.com/office/2006/metadata/properties" xmlns:ns2="81625d4c-a423-47e1-8776-f273f3ef7ce0" xmlns:ns3="f65a858f-9232-4c30-99ad-efa6d065501a" targetNamespace="http://schemas.microsoft.com/office/2006/metadata/properties" ma:root="true" ma:fieldsID="27de83e10b3173ad0d7cd6da0d68e907" ns2:_="" ns3:_="">
     <xsd:import namespace="81625d4c-a423-47e1-8776-f273f3ef7ce0"/>
@@ -4791,15 +5056,6 @@
 </ct:contentTypeSchema>
 </file>
 
-<file path=customXml/item2.xml><?xml version="1.0" encoding="utf-8"?>
-<?mso-contentType ?>
-<FormTemplates xmlns="http://schemas.microsoft.com/sharepoint/v3/contenttype/forms">
-  <Display>DocumentLibraryForm</Display>
-  <Edit>DocumentLibraryForm</Edit>
-  <New>DocumentLibraryForm</New>
-</FormTemplates>
-</file>
-
 <file path=customXml/item3.xml><?xml version="1.0" encoding="utf-8"?>
 <p:properties xmlns:p="http://schemas.microsoft.com/office/2006/metadata/properties" xmlns:xsi="http://www.w3.org/2001/XMLSchema-instance" xmlns:pc="http://schemas.microsoft.com/office/infopath/2007/PartnerControls">
   <documentManagement/>
@@ -4807,6 +5063,14 @@
 </file>
 
 <file path=customXml/itemProps1.xml><?xml version="1.0" encoding="utf-8"?>
+<ds:datastoreItem xmlns:ds="http://schemas.openxmlformats.org/officeDocument/2006/customXml" ds:itemID="{335BD464-00AE-49A9-9FCB-7EBB821E319B}">
+  <ds:schemaRefs>
+    <ds:schemaRef ds:uri="http://schemas.microsoft.com/sharepoint/v3/contenttype/forms"/>
+  </ds:schemaRefs>
+</ds:datastoreItem>
+</file>
+
+<file path=customXml/itemProps2.xml><?xml version="1.0" encoding="utf-8"?>
 <ds:datastoreItem xmlns:ds="http://schemas.openxmlformats.org/officeDocument/2006/customXml" ds:itemID="{8AF8C988-E14E-4924-87D5-7AD31F4A58DD}">
   <ds:schemaRefs>
     <ds:schemaRef ds:uri="http://schemas.microsoft.com/office/2006/metadata/contentType"/>
@@ -4821,14 +5085,6 @@
     <ds:schemaRef ds:uri="http://purl.org/dc/elements/1.1/"/>
     <ds:schemaRef ds:uri="http://purl.org/dc/terms/"/>
     <ds:schemaRef ds:uri="http://schemas.microsoft.com/internal/obd"/>
-  </ds:schemaRefs>
-</ds:datastoreItem>
-</file>
-
-<file path=customXml/itemProps2.xml><?xml version="1.0" encoding="utf-8"?>
-<ds:datastoreItem xmlns:ds="http://schemas.openxmlformats.org/officeDocument/2006/customXml" ds:itemID="{335BD464-00AE-49A9-9FCB-7EBB821E319B}">
-  <ds:schemaRefs>
-    <ds:schemaRef ds:uri="http://schemas.microsoft.com/sharepoint/v3/contenttype/forms"/>
   </ds:schemaRefs>
 </ds:datastoreItem>
 </file>

</xml_diff>